<commit_message>
toby, ben - clarifying instructions
</commit_message>
<xml_diff>
--- a/slides.pptx
+++ b/slides.pptx
@@ -224,7 +224,7 @@
           <a:p>
             <a:fld id="{373B899E-974E-5247-8647-216FBF097DED}" type="datetimeFigureOut">
               <a:rPr lang="en-GB" smtClean="0"/>
-              <a:t>08/06/2021</a:t>
+              <a:t>09/06/2021</a:t>
             </a:fld>
             <a:endParaRPr lang="en-GB"/>
           </a:p>
@@ -1581,7 +1581,7 @@
           <a:p>
             <a:fld id="{410E4BF1-5A1D-CC4A-92B5-635B62E278AD}" type="datetimeFigureOut">
               <a:rPr lang="en-GB" smtClean="0"/>
-              <a:t>08/06/2021</a:t>
+              <a:t>09/06/2021</a:t>
             </a:fld>
             <a:endParaRPr lang="en-GB"/>
           </a:p>
@@ -1781,7 +1781,7 @@
           <a:p>
             <a:fld id="{410E4BF1-5A1D-CC4A-92B5-635B62E278AD}" type="datetimeFigureOut">
               <a:rPr lang="en-GB" smtClean="0"/>
-              <a:t>08/06/2021</a:t>
+              <a:t>09/06/2021</a:t>
             </a:fld>
             <a:endParaRPr lang="en-GB"/>
           </a:p>
@@ -1991,7 +1991,7 @@
           <a:p>
             <a:fld id="{410E4BF1-5A1D-CC4A-92B5-635B62E278AD}" type="datetimeFigureOut">
               <a:rPr lang="en-GB" smtClean="0"/>
-              <a:t>08/06/2021</a:t>
+              <a:t>09/06/2021</a:t>
             </a:fld>
             <a:endParaRPr lang="en-GB"/>
           </a:p>
@@ -2191,7 +2191,7 @@
           <a:p>
             <a:fld id="{410E4BF1-5A1D-CC4A-92B5-635B62E278AD}" type="datetimeFigureOut">
               <a:rPr lang="en-GB" smtClean="0"/>
-              <a:t>08/06/2021</a:t>
+              <a:t>09/06/2021</a:t>
             </a:fld>
             <a:endParaRPr lang="en-GB"/>
           </a:p>
@@ -2467,7 +2467,7 @@
           <a:p>
             <a:fld id="{410E4BF1-5A1D-CC4A-92B5-635B62E278AD}" type="datetimeFigureOut">
               <a:rPr lang="en-GB" smtClean="0"/>
-              <a:t>08/06/2021</a:t>
+              <a:t>09/06/2021</a:t>
             </a:fld>
             <a:endParaRPr lang="en-GB"/>
           </a:p>
@@ -2735,7 +2735,7 @@
           <a:p>
             <a:fld id="{410E4BF1-5A1D-CC4A-92B5-635B62E278AD}" type="datetimeFigureOut">
               <a:rPr lang="en-GB" smtClean="0"/>
-              <a:t>08/06/2021</a:t>
+              <a:t>09/06/2021</a:t>
             </a:fld>
             <a:endParaRPr lang="en-GB"/>
           </a:p>
@@ -3150,7 +3150,7 @@
           <a:p>
             <a:fld id="{410E4BF1-5A1D-CC4A-92B5-635B62E278AD}" type="datetimeFigureOut">
               <a:rPr lang="en-GB" smtClean="0"/>
-              <a:t>08/06/2021</a:t>
+              <a:t>09/06/2021</a:t>
             </a:fld>
             <a:endParaRPr lang="en-GB"/>
           </a:p>
@@ -3292,7 +3292,7 @@
           <a:p>
             <a:fld id="{410E4BF1-5A1D-CC4A-92B5-635B62E278AD}" type="datetimeFigureOut">
               <a:rPr lang="en-GB" smtClean="0"/>
-              <a:t>08/06/2021</a:t>
+              <a:t>09/06/2021</a:t>
             </a:fld>
             <a:endParaRPr lang="en-GB"/>
           </a:p>
@@ -3435,7 +3435,7 @@
           <a:p>
             <a:fld id="{410E4BF1-5A1D-CC4A-92B5-635B62E278AD}" type="datetimeFigureOut">
               <a:rPr lang="en-GB" smtClean="0"/>
-              <a:t>08/06/2021</a:t>
+              <a:t>09/06/2021</a:t>
             </a:fld>
             <a:endParaRPr lang="en-GB"/>
           </a:p>
@@ -3808,7 +3808,7 @@
           <a:p>
             <a:fld id="{410E4BF1-5A1D-CC4A-92B5-635B62E278AD}" type="datetimeFigureOut">
               <a:rPr lang="en-GB" smtClean="0"/>
-              <a:t>08/06/2021</a:t>
+              <a:t>09/06/2021</a:t>
             </a:fld>
             <a:endParaRPr lang="en-GB"/>
           </a:p>
@@ -4097,7 +4097,7 @@
           <a:p>
             <a:fld id="{410E4BF1-5A1D-CC4A-92B5-635B62E278AD}" type="datetimeFigureOut">
               <a:rPr lang="en-GB" smtClean="0"/>
-              <a:t>08/06/2021</a:t>
+              <a:t>09/06/2021</a:t>
             </a:fld>
             <a:endParaRPr lang="en-GB"/>
           </a:p>
@@ -4340,7 +4340,7 @@
           <a:p>
             <a:fld id="{410E4BF1-5A1D-CC4A-92B5-635B62E278AD}" type="datetimeFigureOut">
               <a:rPr lang="en-GB" smtClean="0"/>
-              <a:t>08/06/2021</a:t>
+              <a:t>09/06/2021</a:t>
             </a:fld>
             <a:endParaRPr lang="en-GB"/>
           </a:p>
@@ -6204,7 +6204,7 @@
               <a:rPr lang="en-GB" sz="3200" dirty="0">
                 <a:latin typeface="+mj-lt"/>
               </a:rPr>
-              <a:t>Explore an existing (multi-server) system</a:t>
+              <a:t>Explore an existing (multi service) system</a:t>
             </a:r>
           </a:p>
           <a:p>
@@ -6219,7 +6219,7 @@
               <a:rPr lang="en-GB" sz="3200" dirty="0">
                 <a:latin typeface="+mj-lt"/>
               </a:rPr>
-              <a:t>Make some code changes</a:t>
+              <a:t>Do some coding</a:t>
             </a:r>
           </a:p>
           <a:p>
@@ -6234,7 +6234,7 @@
               <a:rPr lang="en-GB" sz="3200" dirty="0">
                 <a:latin typeface="+mj-lt"/>
               </a:rPr>
-              <a:t>Explore implicit and explicit relationships</a:t>
+              <a:t>Explore the relationships between services</a:t>
             </a:r>
           </a:p>
           <a:p>
@@ -7195,13 +7195,13 @@
   <p:clrMapOvr>
     <a:masterClrMapping/>
   </p:clrMapOvr>
-  <mc:AlternateContent xmlns:mc="http://schemas.openxmlformats.org/markup-compatibility/2006">
-    <mc:Choice xmlns:p159="http://schemas.microsoft.com/office/powerpoint/2015/09/main" Requires="p159">
+  <mc:AlternateContent xmlns:mc="http://schemas.openxmlformats.org/markup-compatibility/2006" xmlns:p159="http://schemas.microsoft.com/office/powerpoint/2015/09/main">
+    <mc:Choice Requires="p159">
       <p:transition xmlns:p14="http://schemas.microsoft.com/office/powerpoint/2010/main" spd="slow" p14:dur="2000">
         <p159:morph option="byObject"/>
       </p:transition>
     </mc:Choice>
-    <mc:Fallback>
+    <mc:Fallback xmlns="">
       <p:transition spd="slow">
         <p:fade/>
       </p:transition>
@@ -7464,13 +7464,13 @@
   <p:clrMapOvr>
     <a:masterClrMapping/>
   </p:clrMapOvr>
-  <mc:AlternateContent xmlns:mc="http://schemas.openxmlformats.org/markup-compatibility/2006">
-    <mc:Choice xmlns:p159="http://schemas.microsoft.com/office/powerpoint/2015/09/main" Requires="p159">
+  <mc:AlternateContent xmlns:mc="http://schemas.openxmlformats.org/markup-compatibility/2006" xmlns:p159="http://schemas.microsoft.com/office/powerpoint/2015/09/main">
+    <mc:Choice Requires="p159">
       <p:transition xmlns:p14="http://schemas.microsoft.com/office/powerpoint/2010/main" spd="slow" p14:dur="2000">
         <p159:morph option="byObject"/>
       </p:transition>
     </mc:Choice>
-    <mc:Fallback>
+    <mc:Fallback xmlns="">
       <p:transition spd="slow">
         <p:fade/>
       </p:transition>

</xml_diff>